<commit_message>
Lesson 13: MongoDB - Read Operations part 1
</commit_message>
<xml_diff>
--- a/slides/klasse13.pptx
+++ b/slides/klasse13.pptx
@@ -128,18 +128,10 @@
 <file path=ppt/commentAuthors.xml><?xml version="1.0" encoding="utf-8"?>
 <p:cmAuthorLst xmlns:a="http://schemas.openxmlformats.org/drawingml/2006/main" xmlns:r="http://schemas.openxmlformats.org/officeDocument/2006/relationships" xmlns:p="http://schemas.openxmlformats.org/presentationml/2006/main">
   <p:cmAuthor id="1" name="Abarca Bayona, Carlos" initials="ABC" lastIdx="1" clrIdx="0">
-    <p:extLst>
-      <p:ext uri="{19B8F6BF-5375-455C-9EA6-DF929625EA0E}">
-        <p15:presenceInfo xmlns:p15="http://schemas.microsoft.com/office/powerpoint/2012/main" userId="" providerId=""/>
-      </p:ext>
-    </p:extLst>
+    <p:extLst/>
   </p:cmAuthor>
   <p:cmAuthor id="2" name="Abarca Bayona, Carlos" initials="ABC [2]" lastIdx="1" clrIdx="1">
-    <p:extLst>
-      <p:ext uri="{19B8F6BF-5375-455C-9EA6-DF929625EA0E}">
-        <p15:presenceInfo xmlns:p15="http://schemas.microsoft.com/office/powerpoint/2012/main" userId="" providerId=""/>
-      </p:ext>
-    </p:extLst>
+    <p:extLst/>
   </p:cmAuthor>
 </p:cmAuthorLst>
 </file>
@@ -3202,7 +3194,7 @@
           <a:p>
             <a:fld id="{D26AADD2-272F-3D4C-AA72-A10290954507}" type="datetimeFigureOut">
               <a:rPr lang="en-US" smtClean="0"/>
-              <a:t>8/25/16</a:t>
+              <a:t>8/29/16</a:t>
             </a:fld>
             <a:endParaRPr lang="en-US"/>
           </a:p>
@@ -3638,7 +3630,7 @@
           <a:p>
             <a:fld id="{D26AADD2-272F-3D4C-AA72-A10290954507}" type="datetimeFigureOut">
               <a:rPr lang="en-US" smtClean="0"/>
-              <a:t>8/25/16</a:t>
+              <a:t>8/29/16</a:t>
             </a:fld>
             <a:endParaRPr lang="en-US"/>
           </a:p>
@@ -3888,7 +3880,7 @@
           <a:p>
             <a:fld id="{D26AADD2-272F-3D4C-AA72-A10290954507}" type="datetimeFigureOut">
               <a:rPr lang="en-US" smtClean="0"/>
-              <a:t>8/25/16</a:t>
+              <a:t>8/29/16</a:t>
             </a:fld>
             <a:endParaRPr lang="en-US"/>
           </a:p>
@@ -4196,7 +4188,7 @@
           <a:p>
             <a:fld id="{D26AADD2-272F-3D4C-AA72-A10290954507}" type="datetimeFigureOut">
               <a:rPr lang="en-US" smtClean="0"/>
-              <a:t>8/25/16</a:t>
+              <a:t>8/29/16</a:t>
             </a:fld>
             <a:endParaRPr lang="en-US"/>
           </a:p>
@@ -4514,7 +4506,7 @@
           <a:p>
             <a:fld id="{D26AADD2-272F-3D4C-AA72-A10290954507}" type="datetimeFigureOut">
               <a:rPr lang="en-US" smtClean="0"/>
-              <a:t>8/25/16</a:t>
+              <a:t>8/29/16</a:t>
             </a:fld>
             <a:endParaRPr lang="en-US"/>
           </a:p>
@@ -4816,7 +4808,7 @@
           <a:p>
             <a:fld id="{D26AADD2-272F-3D4C-AA72-A10290954507}" type="datetimeFigureOut">
               <a:rPr lang="en-US" smtClean="0"/>
-              <a:t>8/25/16</a:t>
+              <a:t>8/29/16</a:t>
             </a:fld>
             <a:endParaRPr lang="en-US"/>
           </a:p>
@@ -5183,7 +5175,7 @@
           <a:p>
             <a:fld id="{D26AADD2-272F-3D4C-AA72-A10290954507}" type="datetimeFigureOut">
               <a:rPr lang="en-US" smtClean="0"/>
-              <a:t>8/25/16</a:t>
+              <a:t>8/29/16</a:t>
             </a:fld>
             <a:endParaRPr lang="en-US"/>
           </a:p>
@@ -5357,7 +5349,7 @@
           <a:p>
             <a:fld id="{D26AADD2-272F-3D4C-AA72-A10290954507}" type="datetimeFigureOut">
               <a:rPr lang="en-US" smtClean="0"/>
-              <a:t>8/25/16</a:t>
+              <a:t>8/29/16</a:t>
             </a:fld>
             <a:endParaRPr lang="en-US"/>
           </a:p>
@@ -5537,7 +5529,7 @@
           <a:p>
             <a:fld id="{D26AADD2-272F-3D4C-AA72-A10290954507}" type="datetimeFigureOut">
               <a:rPr lang="en-US" smtClean="0"/>
-              <a:t>8/25/16</a:t>
+              <a:t>8/29/16</a:t>
             </a:fld>
             <a:endParaRPr lang="en-US"/>
           </a:p>
@@ -5707,7 +5699,7 @@
           <a:p>
             <a:fld id="{D26AADD2-272F-3D4C-AA72-A10290954507}" type="datetimeFigureOut">
               <a:rPr lang="en-US" smtClean="0"/>
-              <a:t>8/25/16</a:t>
+              <a:t>8/29/16</a:t>
             </a:fld>
             <a:endParaRPr lang="en-US"/>
           </a:p>
@@ -5957,7 +5949,7 @@
           <a:p>
             <a:fld id="{D26AADD2-272F-3D4C-AA72-A10290954507}" type="datetimeFigureOut">
               <a:rPr lang="en-US" smtClean="0"/>
-              <a:t>8/25/16</a:t>
+              <a:t>8/29/16</a:t>
             </a:fld>
             <a:endParaRPr lang="en-US"/>
           </a:p>
@@ -6193,7 +6185,7 @@
           <a:p>
             <a:fld id="{D26AADD2-272F-3D4C-AA72-A10290954507}" type="datetimeFigureOut">
               <a:rPr lang="en-US" smtClean="0"/>
-              <a:t>8/25/16</a:t>
+              <a:t>8/29/16</a:t>
             </a:fld>
             <a:endParaRPr lang="en-US"/>
           </a:p>
@@ -6575,7 +6567,7 @@
           <a:p>
             <a:fld id="{D26AADD2-272F-3D4C-AA72-A10290954507}" type="datetimeFigureOut">
               <a:rPr lang="en-US" smtClean="0"/>
-              <a:t>8/25/16</a:t>
+              <a:t>8/29/16</a:t>
             </a:fld>
             <a:endParaRPr lang="en-US"/>
           </a:p>
@@ -6693,7 +6685,7 @@
           <a:p>
             <a:fld id="{D26AADD2-272F-3D4C-AA72-A10290954507}" type="datetimeFigureOut">
               <a:rPr lang="en-US" smtClean="0"/>
-              <a:t>8/25/16</a:t>
+              <a:t>8/29/16</a:t>
             </a:fld>
             <a:endParaRPr lang="en-US"/>
           </a:p>
@@ -6788,7 +6780,7 @@
           <a:p>
             <a:fld id="{D26AADD2-272F-3D4C-AA72-A10290954507}" type="datetimeFigureOut">
               <a:rPr lang="en-US" smtClean="0"/>
-              <a:t>8/25/16</a:t>
+              <a:t>8/29/16</a:t>
             </a:fld>
             <a:endParaRPr lang="en-US"/>
           </a:p>
@@ -7043,7 +7035,7 @@
           <a:p>
             <a:fld id="{D26AADD2-272F-3D4C-AA72-A10290954507}" type="datetimeFigureOut">
               <a:rPr lang="en-US" smtClean="0"/>
-              <a:t>8/25/16</a:t>
+              <a:t>8/29/16</a:t>
             </a:fld>
             <a:endParaRPr lang="en-US"/>
           </a:p>
@@ -7326,7 +7318,7 @@
           <a:p>
             <a:fld id="{D26AADD2-272F-3D4C-AA72-A10290954507}" type="datetimeFigureOut">
               <a:rPr lang="en-US" smtClean="0"/>
-              <a:t>8/25/16</a:t>
+              <a:t>8/29/16</a:t>
             </a:fld>
             <a:endParaRPr lang="en-US"/>
           </a:p>
@@ -7732,7 +7724,7 @@
           <a:p>
             <a:fld id="{D26AADD2-272F-3D4C-AA72-A10290954507}" type="datetimeFigureOut">
               <a:rPr lang="en-US" smtClean="0"/>
-              <a:t>8/25/16</a:t>
+              <a:t>8/29/16</a:t>
             </a:fld>
             <a:endParaRPr lang="en-US"/>
           </a:p>
@@ -8313,7 +8305,17 @@
           <a:p>
             <a:r>
               <a:rPr lang="en-US" dirty="0" smtClean="0"/>
-              <a:t>MONGODB CRUD Operations - Read</a:t>
+              <a:t>MongoDB CRUD Operations</a:t>
+            </a:r>
+          </a:p>
+          <a:p>
+            <a:r>
+              <a:rPr lang="en-US" smtClean="0"/>
+              <a:t>Read – </a:t>
+            </a:r>
+            <a:r>
+              <a:rPr lang="en-US" smtClean="0"/>
+              <a:t>Part 1</a:t>
             </a:r>
             <a:endParaRPr lang="en-US" dirty="0"/>
           </a:p>
@@ -11185,19 +11187,7 @@
             <a:pPr lvl="1"/>
             <a:r>
               <a:rPr lang="en-GB" dirty="0" smtClean="0"/>
-              <a:t>Find and print the </a:t>
-            </a:r>
-            <a:r>
-              <a:rPr lang="en-GB" dirty="0" smtClean="0"/>
-              <a:t>_id </a:t>
-            </a:r>
-            <a:r>
-              <a:rPr lang="en-GB" dirty="0" smtClean="0"/>
-              <a:t>of the students who don’t have </a:t>
-            </a:r>
-            <a:r>
-              <a:rPr lang="en-GB" dirty="0" smtClean="0"/>
-              <a:t>a name (hint: there are 2 alternatives, either the name doesn’t exist or it’s null) </a:t>
+              <a:t>Find and print the _id of the students who don’t have a name (hint: there are 2 alternatives, either the name doesn’t exist or it’s null) </a:t>
             </a:r>
             <a:endParaRPr lang="en-GB" dirty="0"/>
           </a:p>

</xml_diff>

<commit_message>
Correcting typo on lesson 13 and addiong lesson 14
</commit_message>
<xml_diff>
--- a/slides/klasse13.pptx
+++ b/slides/klasse13.pptx
@@ -3194,7 +3194,7 @@
           <a:p>
             <a:fld id="{D26AADD2-272F-3D4C-AA72-A10290954507}" type="datetimeFigureOut">
               <a:rPr lang="en-US" smtClean="0"/>
-              <a:t>8/29/16</a:t>
+              <a:t>9/2/16</a:t>
             </a:fld>
             <a:endParaRPr lang="en-US"/>
           </a:p>
@@ -3630,7 +3630,7 @@
           <a:p>
             <a:fld id="{D26AADD2-272F-3D4C-AA72-A10290954507}" type="datetimeFigureOut">
               <a:rPr lang="en-US" smtClean="0"/>
-              <a:t>8/29/16</a:t>
+              <a:t>9/2/16</a:t>
             </a:fld>
             <a:endParaRPr lang="en-US"/>
           </a:p>
@@ -3880,7 +3880,7 @@
           <a:p>
             <a:fld id="{D26AADD2-272F-3D4C-AA72-A10290954507}" type="datetimeFigureOut">
               <a:rPr lang="en-US" smtClean="0"/>
-              <a:t>8/29/16</a:t>
+              <a:t>9/2/16</a:t>
             </a:fld>
             <a:endParaRPr lang="en-US"/>
           </a:p>
@@ -4188,7 +4188,7 @@
           <a:p>
             <a:fld id="{D26AADD2-272F-3D4C-AA72-A10290954507}" type="datetimeFigureOut">
               <a:rPr lang="en-US" smtClean="0"/>
-              <a:t>8/29/16</a:t>
+              <a:t>9/2/16</a:t>
             </a:fld>
             <a:endParaRPr lang="en-US"/>
           </a:p>
@@ -4506,7 +4506,7 @@
           <a:p>
             <a:fld id="{D26AADD2-272F-3D4C-AA72-A10290954507}" type="datetimeFigureOut">
               <a:rPr lang="en-US" smtClean="0"/>
-              <a:t>8/29/16</a:t>
+              <a:t>9/2/16</a:t>
             </a:fld>
             <a:endParaRPr lang="en-US"/>
           </a:p>
@@ -4808,7 +4808,7 @@
           <a:p>
             <a:fld id="{D26AADD2-272F-3D4C-AA72-A10290954507}" type="datetimeFigureOut">
               <a:rPr lang="en-US" smtClean="0"/>
-              <a:t>8/29/16</a:t>
+              <a:t>9/2/16</a:t>
             </a:fld>
             <a:endParaRPr lang="en-US"/>
           </a:p>
@@ -5175,7 +5175,7 @@
           <a:p>
             <a:fld id="{D26AADD2-272F-3D4C-AA72-A10290954507}" type="datetimeFigureOut">
               <a:rPr lang="en-US" smtClean="0"/>
-              <a:t>8/29/16</a:t>
+              <a:t>9/2/16</a:t>
             </a:fld>
             <a:endParaRPr lang="en-US"/>
           </a:p>
@@ -5349,7 +5349,7 @@
           <a:p>
             <a:fld id="{D26AADD2-272F-3D4C-AA72-A10290954507}" type="datetimeFigureOut">
               <a:rPr lang="en-US" smtClean="0"/>
-              <a:t>8/29/16</a:t>
+              <a:t>9/2/16</a:t>
             </a:fld>
             <a:endParaRPr lang="en-US"/>
           </a:p>
@@ -5529,7 +5529,7 @@
           <a:p>
             <a:fld id="{D26AADD2-272F-3D4C-AA72-A10290954507}" type="datetimeFigureOut">
               <a:rPr lang="en-US" smtClean="0"/>
-              <a:t>8/29/16</a:t>
+              <a:t>9/2/16</a:t>
             </a:fld>
             <a:endParaRPr lang="en-US"/>
           </a:p>
@@ -5699,7 +5699,7 @@
           <a:p>
             <a:fld id="{D26AADD2-272F-3D4C-AA72-A10290954507}" type="datetimeFigureOut">
               <a:rPr lang="en-US" smtClean="0"/>
-              <a:t>8/29/16</a:t>
+              <a:t>9/2/16</a:t>
             </a:fld>
             <a:endParaRPr lang="en-US"/>
           </a:p>
@@ -5949,7 +5949,7 @@
           <a:p>
             <a:fld id="{D26AADD2-272F-3D4C-AA72-A10290954507}" type="datetimeFigureOut">
               <a:rPr lang="en-US" smtClean="0"/>
-              <a:t>8/29/16</a:t>
+              <a:t>9/2/16</a:t>
             </a:fld>
             <a:endParaRPr lang="en-US"/>
           </a:p>
@@ -6185,7 +6185,7 @@
           <a:p>
             <a:fld id="{D26AADD2-272F-3D4C-AA72-A10290954507}" type="datetimeFigureOut">
               <a:rPr lang="en-US" smtClean="0"/>
-              <a:t>8/29/16</a:t>
+              <a:t>9/2/16</a:t>
             </a:fld>
             <a:endParaRPr lang="en-US"/>
           </a:p>
@@ -6567,7 +6567,7 @@
           <a:p>
             <a:fld id="{D26AADD2-272F-3D4C-AA72-A10290954507}" type="datetimeFigureOut">
               <a:rPr lang="en-US" smtClean="0"/>
-              <a:t>8/29/16</a:t>
+              <a:t>9/2/16</a:t>
             </a:fld>
             <a:endParaRPr lang="en-US"/>
           </a:p>
@@ -6685,7 +6685,7 @@
           <a:p>
             <a:fld id="{D26AADD2-272F-3D4C-AA72-A10290954507}" type="datetimeFigureOut">
               <a:rPr lang="en-US" smtClean="0"/>
-              <a:t>8/29/16</a:t>
+              <a:t>9/2/16</a:t>
             </a:fld>
             <a:endParaRPr lang="en-US"/>
           </a:p>
@@ -6780,7 +6780,7 @@
           <a:p>
             <a:fld id="{D26AADD2-272F-3D4C-AA72-A10290954507}" type="datetimeFigureOut">
               <a:rPr lang="en-US" smtClean="0"/>
-              <a:t>8/29/16</a:t>
+              <a:t>9/2/16</a:t>
             </a:fld>
             <a:endParaRPr lang="en-US"/>
           </a:p>
@@ -7035,7 +7035,7 @@
           <a:p>
             <a:fld id="{D26AADD2-272F-3D4C-AA72-A10290954507}" type="datetimeFigureOut">
               <a:rPr lang="en-US" smtClean="0"/>
-              <a:t>8/29/16</a:t>
+              <a:t>9/2/16</a:t>
             </a:fld>
             <a:endParaRPr lang="en-US"/>
           </a:p>
@@ -7318,7 +7318,7 @@
           <a:p>
             <a:fld id="{D26AADD2-272F-3D4C-AA72-A10290954507}" type="datetimeFigureOut">
               <a:rPr lang="en-US" smtClean="0"/>
-              <a:t>8/29/16</a:t>
+              <a:t>9/2/16</a:t>
             </a:fld>
             <a:endParaRPr lang="en-US"/>
           </a:p>
@@ -7724,7 +7724,7 @@
           <a:p>
             <a:fld id="{D26AADD2-272F-3D4C-AA72-A10290954507}" type="datetimeFigureOut">
               <a:rPr lang="en-US" smtClean="0"/>
-              <a:t>8/29/16</a:t>
+              <a:t>9/2/16</a:t>
             </a:fld>
             <a:endParaRPr lang="en-US"/>
           </a:p>
@@ -8311,11 +8311,7 @@
           <a:p>
             <a:r>
               <a:rPr lang="en-US" smtClean="0"/>
-              <a:t>Read – </a:t>
-            </a:r>
-            <a:r>
-              <a:rPr lang="en-US" smtClean="0"/>
-              <a:t>Part 1</a:t>
+              <a:t>Read – Part 1</a:t>
             </a:r>
             <a:endParaRPr lang="en-US" dirty="0"/>
           </a:p>
@@ -13050,7 +13046,7 @@
             </a:r>
             <a:r>
               <a:rPr lang="en-GB" dirty="0" smtClean="0"/>
-              <a:t>1)</a:t>
+              <a:t>1})</a:t>
             </a:r>
             <a:r>
               <a:rPr lang="en-GB" dirty="0"/>

</xml_diff>